<commit_message>
add distance covered + update presentation
</commit_message>
<xml_diff>
--- a/ProjectPresentation.pptx
+++ b/ProjectPresentation.pptx
@@ -2,19 +2,20 @@
 <file path=ppt/presentation.xml><?xml version="1.0" encoding="utf-8"?>
 <p:presentation xmlns:a="http://schemas.openxmlformats.org/drawingml/2006/main" xmlns:r="http://schemas.openxmlformats.org/officeDocument/2006/relationships" xmlns:p="http://schemas.openxmlformats.org/presentationml/2006/main" saveSubsetFonts="1" autoCompressPictures="0">
   <p:sldMasterIdLst>
-    <p:sldMasterId id="2147483672" r:id="rId1"/>
+    <p:sldMasterId id="2147483672" r:id="rId4"/>
   </p:sldMasterIdLst>
   <p:sldIdLst>
-    <p:sldId id="256" r:id="rId2"/>
-    <p:sldId id="261" r:id="rId3"/>
-    <p:sldId id="258" r:id="rId4"/>
-    <p:sldId id="259" r:id="rId5"/>
-    <p:sldId id="260" r:id="rId6"/>
-    <p:sldId id="262" r:id="rId7"/>
-    <p:sldId id="263" r:id="rId8"/>
-    <p:sldId id="265" r:id="rId9"/>
-    <p:sldId id="266" r:id="rId10"/>
+    <p:sldId id="256" r:id="rId5"/>
+    <p:sldId id="261" r:id="rId6"/>
+    <p:sldId id="259" r:id="rId7"/>
+    <p:sldId id="262" r:id="rId8"/>
+    <p:sldId id="263" r:id="rId9"/>
+    <p:sldId id="265" r:id="rId10"/>
     <p:sldId id="267" r:id="rId11"/>
+    <p:sldId id="268" r:id="rId12"/>
+    <p:sldId id="271" r:id="rId13"/>
+    <p:sldId id="272" r:id="rId14"/>
+    <p:sldId id="270" r:id="rId15"/>
   </p:sldIdLst>
   <p:sldSz cx="12192000" cy="6858000"/>
   <p:notesSz cx="6858000" cy="9144000"/>
@@ -113,6 +114,11 @@
       </a:defRPr>
     </a:lvl9pPr>
   </p:defaultTextStyle>
+  <p:extLst>
+    <p:ext uri="{EFAFB233-063F-42B5-8137-9DF3F51BA10A}">
+      <p15:sldGuideLst xmlns:p15="http://schemas.microsoft.com/office/powerpoint/2012/main"/>
+    </p:ext>
+  </p:extLst>
 </p:presentation>
 </file>
 
@@ -279,7 +285,7 @@
           <a:p>
             <a:fld id="{637A66AD-A13B-A240-BBB7-BF8DB73F496F}" type="datetimeFigureOut">
               <a:rPr lang="en-SI" smtClean="0"/>
-              <a:t>20. 4. 24</a:t>
+              <a:t>26. 5. 24</a:t>
             </a:fld>
             <a:endParaRPr lang="en-SI"/>
           </a:p>
@@ -449,7 +455,7 @@
           <a:p>
             <a:fld id="{637A66AD-A13B-A240-BBB7-BF8DB73F496F}" type="datetimeFigureOut">
               <a:rPr lang="en-SI" smtClean="0"/>
-              <a:t>20. 4. 24</a:t>
+              <a:t>26. 5. 24</a:t>
             </a:fld>
             <a:endParaRPr lang="en-SI"/>
           </a:p>
@@ -629,7 +635,7 @@
           <a:p>
             <a:fld id="{637A66AD-A13B-A240-BBB7-BF8DB73F496F}" type="datetimeFigureOut">
               <a:rPr lang="en-SI" smtClean="0"/>
-              <a:t>20. 4. 24</a:t>
+              <a:t>26. 5. 24</a:t>
             </a:fld>
             <a:endParaRPr lang="en-SI"/>
           </a:p>
@@ -799,7 +805,7 @@
           <a:p>
             <a:fld id="{637A66AD-A13B-A240-BBB7-BF8DB73F496F}" type="datetimeFigureOut">
               <a:rPr lang="en-SI" smtClean="0"/>
-              <a:t>20. 4. 24</a:t>
+              <a:t>26. 5. 24</a:t>
             </a:fld>
             <a:endParaRPr lang="en-SI"/>
           </a:p>
@@ -1067,7 +1073,7 @@
           <a:p>
             <a:fld id="{637A66AD-A13B-A240-BBB7-BF8DB73F496F}" type="datetimeFigureOut">
               <a:rPr lang="en-SI" smtClean="0"/>
-              <a:t>20. 4. 24</a:t>
+              <a:t>26. 5. 24</a:t>
             </a:fld>
             <a:endParaRPr lang="en-SI"/>
           </a:p>
@@ -1299,7 +1305,7 @@
           <a:p>
             <a:fld id="{637A66AD-A13B-A240-BBB7-BF8DB73F496F}" type="datetimeFigureOut">
               <a:rPr lang="en-SI" smtClean="0"/>
-              <a:t>20. 4. 24</a:t>
+              <a:t>26. 5. 24</a:t>
             </a:fld>
             <a:endParaRPr lang="en-SI"/>
           </a:p>
@@ -1654,7 +1660,7 @@
           <a:p>
             <a:fld id="{637A66AD-A13B-A240-BBB7-BF8DB73F496F}" type="datetimeFigureOut">
               <a:rPr lang="en-SI" smtClean="0"/>
-              <a:t>20. 4. 24</a:t>
+              <a:t>26. 5. 24</a:t>
             </a:fld>
             <a:endParaRPr lang="en-SI"/>
           </a:p>
@@ -1795,7 +1801,7 @@
           <a:p>
             <a:fld id="{637A66AD-A13B-A240-BBB7-BF8DB73F496F}" type="datetimeFigureOut">
               <a:rPr lang="en-SI" smtClean="0"/>
-              <a:t>20. 4. 24</a:t>
+              <a:t>26. 5. 24</a:t>
             </a:fld>
             <a:endParaRPr lang="en-SI"/>
           </a:p>
@@ -1890,7 +1896,7 @@
           <a:p>
             <a:fld id="{637A66AD-A13B-A240-BBB7-BF8DB73F496F}" type="datetimeFigureOut">
               <a:rPr lang="en-SI" smtClean="0"/>
-              <a:t>20. 4. 24</a:t>
+              <a:t>26. 5. 24</a:t>
             </a:fld>
             <a:endParaRPr lang="en-SI"/>
           </a:p>
@@ -2247,7 +2253,7 @@
           <a:p>
             <a:fld id="{637A66AD-A13B-A240-BBB7-BF8DB73F496F}" type="datetimeFigureOut">
               <a:rPr lang="en-SI" smtClean="0"/>
-              <a:t>20. 4. 24</a:t>
+              <a:t>26. 5. 24</a:t>
             </a:fld>
             <a:endParaRPr lang="en-SI"/>
           </a:p>
@@ -2603,7 +2609,7 @@
           <a:p>
             <a:fld id="{637A66AD-A13B-A240-BBB7-BF8DB73F496F}" type="datetimeFigureOut">
               <a:rPr lang="en-SI" smtClean="0"/>
-              <a:t>20. 4. 24</a:t>
+              <a:t>26. 5. 24</a:t>
             </a:fld>
             <a:endParaRPr lang="en-SI"/>
           </a:p>
@@ -2843,7 +2849,7 @@
           <a:p>
             <a:fld id="{637A66AD-A13B-A240-BBB7-BF8DB73F496F}" type="datetimeFigureOut">
               <a:rPr lang="en-SI" smtClean="0"/>
-              <a:t>20. 4. 24</a:t>
+              <a:t>26. 5. 24</a:t>
             </a:fld>
             <a:endParaRPr lang="en-SI"/>
           </a:p>
@@ -3335,14 +3341,14 @@
           <a:lstStyle/>
           <a:p>
             <a:r>
-              <a:rPr lang="en-SI" sz="3000"/>
+              <a:rPr lang="en-SI" sz="3000" dirty="0"/>
               <a:t>PROJECT SEMINAR:</a:t>
             </a:r>
             <a:br>
-              <a:rPr lang="en-SI" sz="3000"/>
+              <a:rPr lang="en-SI" sz="3000" dirty="0"/>
             </a:br>
             <a:r>
-              <a:rPr lang="en-SI" sz="3000"/>
+              <a:rPr lang="en-SI" sz="3000" dirty="0"/>
               <a:t>APP FOR TRAINING ANALISYS</a:t>
             </a:r>
           </a:p>
@@ -3469,7 +3475,7 @@
           <p:cNvPr id="2" name="Title 1">
             <a:extLst>
               <a:ext uri="{FF2B5EF4-FFF2-40B4-BE49-F238E27FC236}">
-                <a16:creationId xmlns:a16="http://schemas.microsoft.com/office/drawing/2014/main" id="{5642AD9B-94A1-A7ED-D7D9-C8E8C84894E8}"/>
+                <a16:creationId xmlns:a16="http://schemas.microsoft.com/office/drawing/2014/main" id="{D8611EE7-CD77-B883-8E05-0874B123ACE8}"/>
               </a:ext>
             </a:extLst>
           </p:cNvPr>
@@ -3487,7 +3493,7 @@
           <a:p>
             <a:r>
               <a:rPr lang="en-SI" dirty="0"/>
-              <a:t>Work plan</a:t>
+              <a:t>IMPROVEMENTS</a:t>
             </a:r>
           </a:p>
         </p:txBody>
@@ -3497,7 +3503,7 @@
           <p:cNvPr id="3" name="Content Placeholder 2">
             <a:extLst>
               <a:ext uri="{FF2B5EF4-FFF2-40B4-BE49-F238E27FC236}">
-                <a16:creationId xmlns:a16="http://schemas.microsoft.com/office/drawing/2014/main" id="{E924E37D-FB13-F89D-D0F8-130B31087517}"/>
+                <a16:creationId xmlns:a16="http://schemas.microsoft.com/office/drawing/2014/main" id="{A816B126-789C-CF67-AC3E-1316D1491FE3}"/>
               </a:ext>
             </a:extLst>
           </p:cNvPr>
@@ -3514,17 +3520,97 @@
           <a:lstStyle/>
           <a:p>
             <a:r>
-              <a:rPr lang="en-SI"/>
-              <a:t>tba</a:t>
-            </a:r>
-            <a:endParaRPr lang="en-SI" dirty="0"/>
+              <a:rPr lang="en-SI" dirty="0"/>
+              <a:t>3rd party app data import</a:t>
+            </a:r>
+          </a:p>
+          <a:p>
+            <a:r>
+              <a:rPr lang="en-SI" dirty="0"/>
+              <a:t>Coaching option (code written)</a:t>
+            </a:r>
+          </a:p>
+          <a:p>
+            <a:r>
+              <a:rPr lang="en-SI" dirty="0"/>
+              <a:t>Add route (code written)</a:t>
+            </a:r>
+          </a:p>
+          <a:p>
+            <a:r>
+              <a:rPr lang="en-SI" dirty="0"/>
+              <a:t>Add smaller open source LLM</a:t>
+            </a:r>
           </a:p>
         </p:txBody>
       </p:sp>
     </p:spTree>
     <p:extLst>
       <p:ext uri="{BB962C8B-B14F-4D97-AF65-F5344CB8AC3E}">
-        <p14:creationId xmlns:p14="http://schemas.microsoft.com/office/powerpoint/2010/main" val="1310027608"/>
+        <p14:creationId xmlns:p14="http://schemas.microsoft.com/office/powerpoint/2010/main" val="2778425306"/>
+      </p:ext>
+    </p:extLst>
+  </p:cSld>
+  <p:clrMapOvr>
+    <a:masterClrMapping/>
+  </p:clrMapOvr>
+</p:sld>
+</file>
+
+<file path=ppt/slides/slide11.xml><?xml version="1.0" encoding="utf-8"?>
+<p:sld xmlns:a="http://schemas.openxmlformats.org/drawingml/2006/main" xmlns:r="http://schemas.openxmlformats.org/officeDocument/2006/relationships" xmlns:p="http://schemas.openxmlformats.org/presentationml/2006/main">
+  <p:cSld>
+    <p:spTree>
+      <p:nvGrpSpPr>
+        <p:cNvPr id="1" name=""/>
+        <p:cNvGrpSpPr/>
+        <p:nvPr/>
+      </p:nvGrpSpPr>
+      <p:grpSpPr>
+        <a:xfrm>
+          <a:off x="0" y="0"/>
+          <a:ext cx="0" cy="0"/>
+          <a:chOff x="0" y="0"/>
+          <a:chExt cx="0" cy="0"/>
+        </a:xfrm>
+      </p:grpSpPr>
+      <p:sp>
+        <p:nvSpPr>
+          <p:cNvPr id="2" name="Title 1">
+            <a:extLst>
+              <a:ext uri="{FF2B5EF4-FFF2-40B4-BE49-F238E27FC236}">
+                <a16:creationId xmlns:a16="http://schemas.microsoft.com/office/drawing/2014/main" id="{BF7D25EE-5914-F100-E84B-7732CDDFAE4E}"/>
+              </a:ext>
+            </a:extLst>
+          </p:cNvPr>
+          <p:cNvSpPr>
+            <a:spLocks noGrp="1"/>
+          </p:cNvSpPr>
+          <p:nvPr>
+            <p:ph type="title"/>
+          </p:nvPr>
+        </p:nvSpPr>
+        <p:spPr>
+          <a:xfrm>
+            <a:off x="2231136" y="2834640"/>
+            <a:ext cx="7729728" cy="1188720"/>
+          </a:xfrm>
+        </p:spPr>
+        <p:txBody>
+          <a:bodyPr/>
+          <a:lstStyle/>
+          <a:p>
+            <a:r>
+              <a:rPr lang="en-SI" dirty="0"/>
+              <a:t>THANK YOU</a:t>
+            </a:r>
+          </a:p>
+        </p:txBody>
+      </p:sp>
+    </p:spTree>
+    <p:extLst>
+      <p:ext uri="{BB962C8B-B14F-4D97-AF65-F5344CB8AC3E}">
+        <p14:creationId xmlns:p14="http://schemas.microsoft.com/office/powerpoint/2010/main" val="3211100743"/>
       </p:ext>
     </p:extLst>
   </p:cSld>
@@ -3602,19 +3688,7 @@
           <a:p>
             <a:r>
               <a:rPr lang="en-SI" dirty="0"/>
-              <a:t>About authors</a:t>
-            </a:r>
-          </a:p>
-          <a:p>
-            <a:r>
-              <a:rPr lang="en-SI" dirty="0"/>
               <a:t>Project idea</a:t>
-            </a:r>
-          </a:p>
-          <a:p>
-            <a:r>
-              <a:rPr lang="en-SI" dirty="0"/>
-              <a:t>Project requirements</a:t>
             </a:r>
           </a:p>
           <a:p>
@@ -3626,13 +3700,13 @@
           <a:p>
             <a:r>
               <a:rPr lang="en-SI" dirty="0"/>
-              <a:t>Other apps</a:t>
+              <a:t>Work plan</a:t>
             </a:r>
           </a:p>
           <a:p>
             <a:r>
               <a:rPr lang="en-SI" dirty="0"/>
-              <a:t>Work plan</a:t>
+              <a:t>Demo</a:t>
             </a:r>
           </a:p>
         </p:txBody>
@@ -3651,153 +3725,6 @@
 </file>
 
 <file path=ppt/slides/slide3.xml><?xml version="1.0" encoding="utf-8"?>
-<p:sld xmlns:a="http://schemas.openxmlformats.org/drawingml/2006/main" xmlns:r="http://schemas.openxmlformats.org/officeDocument/2006/relationships" xmlns:p="http://schemas.openxmlformats.org/presentationml/2006/main">
-  <p:cSld>
-    <p:spTree>
-      <p:nvGrpSpPr>
-        <p:cNvPr id="1" name=""/>
-        <p:cNvGrpSpPr/>
-        <p:nvPr/>
-      </p:nvGrpSpPr>
-      <p:grpSpPr>
-        <a:xfrm>
-          <a:off x="0" y="0"/>
-          <a:ext cx="0" cy="0"/>
-          <a:chOff x="0" y="0"/>
-          <a:chExt cx="0" cy="0"/>
-        </a:xfrm>
-      </p:grpSpPr>
-      <p:sp>
-        <p:nvSpPr>
-          <p:cNvPr id="2" name="Title 1">
-            <a:extLst>
-              <a:ext uri="{FF2B5EF4-FFF2-40B4-BE49-F238E27FC236}">
-                <a16:creationId xmlns:a16="http://schemas.microsoft.com/office/drawing/2014/main" id="{41667909-E523-E36B-A0D1-772180995BA6}"/>
-              </a:ext>
-            </a:extLst>
-          </p:cNvPr>
-          <p:cNvSpPr>
-            <a:spLocks noGrp="1"/>
-          </p:cNvSpPr>
-          <p:nvPr>
-            <p:ph type="title"/>
-          </p:nvPr>
-        </p:nvSpPr>
-        <p:spPr/>
-        <p:txBody>
-          <a:bodyPr/>
-          <a:lstStyle/>
-          <a:p>
-            <a:r>
-              <a:rPr lang="en-SI" dirty="0"/>
-              <a:t>authors</a:t>
-            </a:r>
-          </a:p>
-        </p:txBody>
-      </p:sp>
-      <p:sp>
-        <p:nvSpPr>
-          <p:cNvPr id="3" name="Content Placeholder 2">
-            <a:extLst>
-              <a:ext uri="{FF2B5EF4-FFF2-40B4-BE49-F238E27FC236}">
-                <a16:creationId xmlns:a16="http://schemas.microsoft.com/office/drawing/2014/main" id="{481ACBA0-DB8F-5227-C895-FEB294C9647E}"/>
-              </a:ext>
-            </a:extLst>
-          </p:cNvPr>
-          <p:cNvSpPr>
-            <a:spLocks noGrp="1"/>
-          </p:cNvSpPr>
-          <p:nvPr>
-            <p:ph idx="1"/>
-          </p:nvPr>
-        </p:nvSpPr>
-        <p:spPr>
-          <a:xfrm>
-            <a:off x="2231136" y="2638044"/>
-            <a:ext cx="7729728" cy="3780173"/>
-          </a:xfrm>
-        </p:spPr>
-        <p:txBody>
-          <a:bodyPr/>
-          <a:lstStyle/>
-          <a:p>
-            <a:r>
-              <a:rPr lang="en-SI" dirty="0"/>
-              <a:t>Andraž Anderle</a:t>
-            </a:r>
-          </a:p>
-          <a:p>
-            <a:pPr lvl="1">
-              <a:buFont typeface="Courier New" panose="02070309020205020404" pitchFamily="49" charset="0"/>
-              <a:buChar char="o"/>
-            </a:pPr>
-            <a:r>
-              <a:rPr lang="en-SI" dirty="0"/>
-              <a:t>Team lead, project lead</a:t>
-            </a:r>
-          </a:p>
-          <a:p>
-            <a:pPr lvl="1">
-              <a:buFont typeface="Courier New" panose="02070309020205020404" pitchFamily="49" charset="0"/>
-              <a:buChar char="o"/>
-            </a:pPr>
-            <a:r>
-              <a:rPr lang="en-SI" dirty="0"/>
-              <a:t>Native iOS/Android dev</a:t>
-            </a:r>
-          </a:p>
-          <a:p>
-            <a:pPr lvl="1">
-              <a:buFont typeface="Courier New" panose="02070309020205020404" pitchFamily="49" charset="0"/>
-              <a:buChar char="o"/>
-            </a:pPr>
-            <a:endParaRPr lang="en-SI" dirty="0"/>
-          </a:p>
-          <a:p>
-            <a:endParaRPr lang="en-SI" dirty="0"/>
-          </a:p>
-          <a:p>
-            <a:r>
-              <a:rPr lang="en-SI" dirty="0"/>
-              <a:t>Jan Jovan</a:t>
-            </a:r>
-          </a:p>
-          <a:p>
-            <a:pPr lvl="1">
-              <a:buFont typeface="Courier New" panose="02070309020205020404" pitchFamily="49" charset="0"/>
-              <a:buChar char="o"/>
-            </a:pPr>
-            <a:r>
-              <a:rPr lang="en-SI" dirty="0"/>
-              <a:t>Backend developer</a:t>
-            </a:r>
-          </a:p>
-          <a:p>
-            <a:pPr lvl="1">
-              <a:buFont typeface="Courier New" panose="02070309020205020404" pitchFamily="49" charset="0"/>
-              <a:buChar char="o"/>
-            </a:pPr>
-            <a:r>
-              <a:rPr lang="en-SI" dirty="0"/>
-              <a:t>AI engineer</a:t>
-            </a:r>
-          </a:p>
-        </p:txBody>
-      </p:sp>
-    </p:spTree>
-    <p:extLst>
-      <p:ext uri="{BB962C8B-B14F-4D97-AF65-F5344CB8AC3E}">
-        <p14:creationId xmlns:p14="http://schemas.microsoft.com/office/powerpoint/2010/main" val="2300250945"/>
-      </p:ext>
-    </p:extLst>
-  </p:cSld>
-  <p:clrMapOvr>
-    <a:masterClrMapping/>
-  </p:clrMapOvr>
-</p:sld>
-</file>
-
-<file path=ppt/slides/slide4.xml><?xml version="1.0" encoding="utf-8"?>
 <p:sld xmlns:a="http://schemas.openxmlformats.org/drawingml/2006/main" xmlns:r="http://schemas.openxmlformats.org/officeDocument/2006/relationships" xmlns:p="http://schemas.openxmlformats.org/presentationml/2006/main">
   <p:cSld>
     <p:bg>
@@ -3954,7 +3881,15 @@
           <a:p>
             <a:r>
               <a:rPr lang="en-SI" dirty="0"/>
-              <a:t>Cycling, possible other sports</a:t>
+              <a:t>Cycling, possible</a:t>
+            </a:r>
+            <a:r>
+              <a:rPr lang="en-GB" dirty="0"/>
+              <a:t>e</a:t>
+            </a:r>
+            <a:r>
+              <a:rPr lang="en-SI" dirty="0"/>
+              <a:t> other sports</a:t>
             </a:r>
           </a:p>
           <a:p>
@@ -3975,17 +3910,9 @@
 </p:sld>
 </file>
 
-<file path=ppt/slides/slide5.xml><?xml version="1.0" encoding="utf-8"?>
+<file path=ppt/slides/slide4.xml><?xml version="1.0" encoding="utf-8"?>
 <p:sld xmlns:a="http://schemas.openxmlformats.org/drawingml/2006/main" xmlns:r="http://schemas.openxmlformats.org/officeDocument/2006/relationships" xmlns:p="http://schemas.openxmlformats.org/presentationml/2006/main">
   <p:cSld>
-    <p:bg>
-      <p:bgPr>
-        <a:solidFill>
-          <a:schemeClr val="bg2"/>
-        </a:solidFill>
-        <a:effectLst/>
-      </p:bgPr>
-    </p:bg>
     <p:spTree>
       <p:nvGrpSpPr>
         <p:cNvPr id="1" name=""/>
@@ -4005,7 +3932,7 @@
           <p:cNvPr id="2" name="Title 1">
             <a:extLst>
               <a:ext uri="{FF2B5EF4-FFF2-40B4-BE49-F238E27FC236}">
-                <a16:creationId xmlns:a16="http://schemas.microsoft.com/office/drawing/2014/main" id="{27A3366A-7AE4-0427-DDAE-4A3BA8718E49}"/>
+                <a16:creationId xmlns:a16="http://schemas.microsoft.com/office/drawing/2014/main" id="{93311856-B083-D47C-0E3C-A7871EA92023}"/>
               </a:ext>
             </a:extLst>
           </p:cNvPr>
@@ -4016,12 +3943,140 @@
             <p:ph type="title"/>
           </p:nvPr>
         </p:nvSpPr>
-        <p:spPr>
-          <a:xfrm>
-            <a:off x="5445496" y="978776"/>
-            <a:ext cx="5925310" cy="1174991"/>
-          </a:xfrm>
-        </p:spPr>
+        <p:spPr/>
+        <p:txBody>
+          <a:bodyPr/>
+          <a:lstStyle/>
+          <a:p>
+            <a:r>
+              <a:rPr lang="en-GB" dirty="0"/>
+              <a:t>T</a:t>
+            </a:r>
+            <a:r>
+              <a:rPr lang="en-SI" dirty="0"/>
+              <a:t>raining analysis</a:t>
+            </a:r>
+          </a:p>
+        </p:txBody>
+      </p:sp>
+      <p:sp>
+        <p:nvSpPr>
+          <p:cNvPr id="3" name="Content Placeholder 2">
+            <a:extLst>
+              <a:ext uri="{FF2B5EF4-FFF2-40B4-BE49-F238E27FC236}">
+                <a16:creationId xmlns:a16="http://schemas.microsoft.com/office/drawing/2014/main" id="{FF4D53C3-914A-D01B-1AFE-2F986AF1B8E5}"/>
+              </a:ext>
+            </a:extLst>
+          </p:cNvPr>
+          <p:cNvSpPr>
+            <a:spLocks noGrp="1"/>
+          </p:cNvSpPr>
+          <p:nvPr>
+            <p:ph idx="1"/>
+          </p:nvPr>
+        </p:nvSpPr>
+        <p:spPr/>
+        <p:txBody>
+          <a:bodyPr/>
+          <a:lstStyle/>
+          <a:p>
+            <a:r>
+              <a:rPr lang="en-SI" dirty="0"/>
+              <a:t>Upload training .fit file</a:t>
+            </a:r>
+          </a:p>
+          <a:p>
+            <a:r>
+              <a:rPr lang="en-SI" dirty="0"/>
+              <a:t>Various data fields</a:t>
+            </a:r>
+          </a:p>
+          <a:p>
+            <a:r>
+              <a:rPr lang="en-SI" dirty="0"/>
+              <a:t>Graphs</a:t>
+            </a:r>
+          </a:p>
+          <a:p>
+            <a:endParaRPr lang="en-SI" dirty="0"/>
+          </a:p>
+        </p:txBody>
+      </p:sp>
+    </p:spTree>
+    <p:extLst>
+      <p:ext uri="{BB962C8B-B14F-4D97-AF65-F5344CB8AC3E}">
+        <p14:creationId xmlns:p14="http://schemas.microsoft.com/office/powerpoint/2010/main" val="1813871563"/>
+      </p:ext>
+    </p:extLst>
+  </p:cSld>
+  <p:clrMapOvr>
+    <a:masterClrMapping/>
+  </p:clrMapOvr>
+</p:sld>
+</file>
+
+<file path=ppt/slides/slide5.xml><?xml version="1.0" encoding="utf-8"?>
+<p:sld xmlns:a="http://schemas.openxmlformats.org/drawingml/2006/main" xmlns:r="http://schemas.openxmlformats.org/officeDocument/2006/relationships" xmlns:p="http://schemas.openxmlformats.org/presentationml/2006/main">
+  <p:cSld>
+    <p:spTree>
+      <p:nvGrpSpPr>
+        <p:cNvPr id="1" name=""/>
+        <p:cNvGrpSpPr/>
+        <p:nvPr/>
+      </p:nvGrpSpPr>
+      <p:grpSpPr>
+        <a:xfrm>
+          <a:off x="0" y="0"/>
+          <a:ext cx="0" cy="0"/>
+          <a:chOff x="0" y="0"/>
+          <a:chExt cx="0" cy="0"/>
+        </a:xfrm>
+      </p:grpSpPr>
+      <p:sp>
+        <p:nvSpPr>
+          <p:cNvPr id="2" name="Title 1">
+            <a:extLst>
+              <a:ext uri="{FF2B5EF4-FFF2-40B4-BE49-F238E27FC236}">
+                <a16:creationId xmlns:a16="http://schemas.microsoft.com/office/drawing/2014/main" id="{6B0C98E0-6559-191E-8773-DC656DA6405E}"/>
+              </a:ext>
+            </a:extLst>
+          </p:cNvPr>
+          <p:cNvSpPr>
+            <a:spLocks noGrp="1"/>
+          </p:cNvSpPr>
+          <p:nvPr>
+            <p:ph type="title"/>
+          </p:nvPr>
+        </p:nvSpPr>
+        <p:spPr/>
+        <p:txBody>
+          <a:bodyPr/>
+          <a:lstStyle/>
+          <a:p>
+            <a:r>
+              <a:rPr lang="en-SI" dirty="0"/>
+              <a:t>TOOLS</a:t>
+            </a:r>
+          </a:p>
+        </p:txBody>
+      </p:sp>
+      <p:sp>
+        <p:nvSpPr>
+          <p:cNvPr id="3" name="Content Placeholder 2">
+            <a:extLst>
+              <a:ext uri="{FF2B5EF4-FFF2-40B4-BE49-F238E27FC236}">
+                <a16:creationId xmlns:a16="http://schemas.microsoft.com/office/drawing/2014/main" id="{1E4F4320-80C6-5E6A-23B5-41F08AB4130A}"/>
+              </a:ext>
+            </a:extLst>
+          </p:cNvPr>
+          <p:cNvSpPr>
+            <a:spLocks noGrp="1"/>
+          </p:cNvSpPr>
+          <p:nvPr>
+            <p:ph idx="1"/>
+          </p:nvPr>
+        </p:nvSpPr>
+        <p:spPr/>
         <p:txBody>
           <a:bodyPr>
             <a:normAutofit/>
@@ -4029,106 +4084,74 @@
           <a:lstStyle/>
           <a:p>
             <a:r>
-              <a:rPr lang="en-GB" sz="2400"/>
-              <a:t>P</a:t>
-            </a:r>
-            <a:r>
-              <a:rPr lang="en-SI" sz="2400"/>
-              <a:t>roject requirements</a:t>
-            </a:r>
-          </a:p>
-        </p:txBody>
-      </p:sp>
-      <p:pic>
-        <p:nvPicPr>
-          <p:cNvPr id="5" name="Picture 4" descr="Pens and rulers">
-            <a:extLst>
-              <a:ext uri="{FF2B5EF4-FFF2-40B4-BE49-F238E27FC236}">
-                <a16:creationId xmlns:a16="http://schemas.microsoft.com/office/drawing/2014/main" id="{CF1C0899-4C56-769D-EEC9-913676B5C776}"/>
-              </a:ext>
-            </a:extLst>
-          </p:cNvPr>
-          <p:cNvPicPr>
-            <a:picLocks noChangeAspect="1"/>
-          </p:cNvPicPr>
-          <p:nvPr/>
-        </p:nvPicPr>
-        <p:blipFill rotWithShape="1">
-          <a:blip r:embed="rId2"/>
-          <a:srcRect l="24099" r="30570" b="-1"/>
-          <a:stretch/>
-        </p:blipFill>
-        <p:spPr>
-          <a:xfrm>
-            <a:off x="20" y="10"/>
-            <a:ext cx="4657325" cy="6857990"/>
-          </a:xfrm>
-          <a:prstGeom prst="rect">
-            <a:avLst/>
-          </a:prstGeom>
-        </p:spPr>
-      </p:pic>
-      <p:sp>
-        <p:nvSpPr>
-          <p:cNvPr id="3" name="Content Placeholder 2">
-            <a:extLst>
-              <a:ext uri="{FF2B5EF4-FFF2-40B4-BE49-F238E27FC236}">
-                <a16:creationId xmlns:a16="http://schemas.microsoft.com/office/drawing/2014/main" id="{C180CB2A-9D80-8CCC-2E6C-7CC30279400F}"/>
-              </a:ext>
-            </a:extLst>
-          </p:cNvPr>
-          <p:cNvSpPr>
-            <a:spLocks noGrp="1"/>
-          </p:cNvSpPr>
-          <p:nvPr>
-            <p:ph idx="1"/>
-          </p:nvPr>
-        </p:nvSpPr>
-        <p:spPr>
-          <a:xfrm>
-            <a:off x="5445496" y="2640692"/>
-            <a:ext cx="5925310" cy="3255252"/>
-          </a:xfrm>
-        </p:spPr>
-        <p:txBody>
-          <a:bodyPr>
-            <a:normAutofit/>
-          </a:bodyPr>
-          <a:lstStyle/>
-          <a:p>
-            <a:r>
-              <a:rPr lang="en-GB" dirty="0"/>
-              <a:t>Simple to use</a:t>
-            </a:r>
-          </a:p>
-          <a:p>
-            <a:r>
-              <a:rPr lang="en-GB" dirty="0"/>
-              <a:t>Easy to understand</a:t>
-            </a:r>
-          </a:p>
-          <a:p>
-            <a:r>
-              <a:rPr lang="en-GB" dirty="0"/>
-              <a:t>Powerful tool</a:t>
-            </a:r>
-          </a:p>
-          <a:p>
-            <a:r>
-              <a:rPr lang="en-GB" dirty="0"/>
-              <a:t>Many functions</a:t>
-            </a:r>
-            <a:endParaRPr lang="en-SI" dirty="0"/>
-          </a:p>
-          <a:p>
-            <a:endParaRPr lang="en-SI" dirty="0"/>
+              <a:rPr lang="en-SI" dirty="0"/>
+              <a:t>Mobile app:</a:t>
+            </a:r>
+          </a:p>
+          <a:p>
+            <a:pPr lvl="1">
+              <a:buFont typeface="Courier New" panose="02070309020205020404" pitchFamily="49" charset="0"/>
+              <a:buChar char="o"/>
+            </a:pPr>
+            <a:r>
+              <a:rPr lang="en-SI" dirty="0"/>
+              <a:t>UI: Figma</a:t>
+            </a:r>
+          </a:p>
+          <a:p>
+            <a:pPr lvl="1">
+              <a:buFont typeface="Courier New" panose="02070309020205020404" pitchFamily="49" charset="0"/>
+              <a:buChar char="o"/>
+            </a:pPr>
+            <a:r>
+              <a:rPr lang="en-SI" dirty="0"/>
+              <a:t>Flutter</a:t>
+            </a:r>
+          </a:p>
+          <a:p>
+            <a:r>
+              <a:rPr lang="en-SI" dirty="0"/>
+              <a:t>Database:  Firerbase</a:t>
+            </a:r>
+          </a:p>
+          <a:p>
+            <a:r>
+              <a:rPr lang="en-SI" dirty="0"/>
+              <a:t>Hosting: Firebase Cloud Functions</a:t>
+            </a:r>
+          </a:p>
+          <a:p>
+            <a:r>
+              <a:rPr lang="en-SI" dirty="0"/>
+              <a:t>Training data processing:</a:t>
+            </a:r>
+          </a:p>
+          <a:p>
+            <a:pPr lvl="1">
+              <a:buFont typeface="Courier New" panose="02070309020205020404" pitchFamily="49" charset="0"/>
+              <a:buChar char="o"/>
+            </a:pPr>
+            <a:r>
+              <a:rPr lang="en-SI" dirty="0"/>
+              <a:t>Python</a:t>
+            </a:r>
+          </a:p>
+          <a:p>
+            <a:pPr lvl="1">
+              <a:buFont typeface="Courier New" panose="02070309020205020404" pitchFamily="49" charset="0"/>
+              <a:buChar char="o"/>
+            </a:pPr>
+            <a:r>
+              <a:rPr lang="en-SI" dirty="0"/>
+              <a:t>Libraries</a:t>
+            </a:r>
           </a:p>
         </p:txBody>
       </p:sp>
     </p:spTree>
     <p:extLst>
       <p:ext uri="{BB962C8B-B14F-4D97-AF65-F5344CB8AC3E}">
-        <p14:creationId xmlns:p14="http://schemas.microsoft.com/office/powerpoint/2010/main" val="2470748593"/>
+        <p14:creationId xmlns:p14="http://schemas.microsoft.com/office/powerpoint/2010/main" val="4050961716"/>
       </p:ext>
     </p:extLst>
   </p:cSld>
@@ -4160,7 +4183,7 @@
           <p:cNvPr id="2" name="Title 1">
             <a:extLst>
               <a:ext uri="{FF2B5EF4-FFF2-40B4-BE49-F238E27FC236}">
-                <a16:creationId xmlns:a16="http://schemas.microsoft.com/office/drawing/2014/main" id="{93311856-B083-D47C-0E3C-A7871EA92023}"/>
+                <a16:creationId xmlns:a16="http://schemas.microsoft.com/office/drawing/2014/main" id="{E8260719-1002-D36B-1AC0-16B06E6048D7}"/>
               </a:ext>
             </a:extLst>
           </p:cNvPr>
@@ -4177,12 +4200,8 @@
           <a:lstStyle/>
           <a:p>
             <a:r>
-              <a:rPr lang="en-GB" dirty="0"/>
-              <a:t>T</a:t>
-            </a:r>
-            <a:r>
               <a:rPr lang="en-SI" dirty="0"/>
-              <a:t>raining analysis</a:t>
+              <a:t>TOOLS</a:t>
             </a:r>
           </a:p>
         </p:txBody>
@@ -4192,7 +4211,7 @@
           <p:cNvPr id="3" name="Content Placeholder 2">
             <a:extLst>
               <a:ext uri="{FF2B5EF4-FFF2-40B4-BE49-F238E27FC236}">
-                <a16:creationId xmlns:a16="http://schemas.microsoft.com/office/drawing/2014/main" id="{FF4D53C3-914A-D01B-1AFE-2F986AF1B8E5}"/>
+                <a16:creationId xmlns:a16="http://schemas.microsoft.com/office/drawing/2014/main" id="{591EAC77-A702-98FB-983E-282A6FE766BA}"/>
               </a:ext>
             </a:extLst>
           </p:cNvPr>
@@ -4210,33 +4229,45 @@
           <a:p>
             <a:r>
               <a:rPr lang="en-SI" dirty="0"/>
-              <a:t>Training upload from 3rd party apps</a:t>
-            </a:r>
-          </a:p>
-          <a:p>
+              <a:t>Version control: </a:t>
+            </a:r>
+            <a:r>
+              <a:rPr lang="en-GB" dirty="0"/>
+              <a:t>Git &amp; GitHub</a:t>
+            </a:r>
+            <a:endParaRPr lang="en-SI" dirty="0"/>
+          </a:p>
+          <a:p>
+            <a:r>
+              <a:rPr lang="en-GB" dirty="0"/>
+              <a:t>Project</a:t>
+            </a:r>
             <a:r>
               <a:rPr lang="en-SI" dirty="0"/>
-              <a:t>Various data fields</a:t>
-            </a:r>
-          </a:p>
-          <a:p>
+              <a:t> </a:t>
+            </a:r>
+            <a:r>
+              <a:rPr lang="en-GB" dirty="0"/>
+              <a:t>timeline and tasks assignment</a:t>
+            </a:r>
             <a:r>
               <a:rPr lang="en-SI" dirty="0"/>
-              <a:t>Graphs</a:t>
+              <a:t>: Notion</a:t>
             </a:r>
           </a:p>
           <a:p>
             <a:r>
               <a:rPr lang="en-SI" dirty="0"/>
-              <a:t>Coaching option</a:t>
-            </a:r>
+              <a:t>IDE:  VS Code, PyCharm,  AndroidStudio</a:t>
+            </a:r>
+            <a:endParaRPr lang="en-GB" dirty="0"/>
           </a:p>
         </p:txBody>
       </p:sp>
     </p:spTree>
     <p:extLst>
       <p:ext uri="{BB962C8B-B14F-4D97-AF65-F5344CB8AC3E}">
-        <p14:creationId xmlns:p14="http://schemas.microsoft.com/office/powerpoint/2010/main" val="1813871563"/>
+        <p14:creationId xmlns:p14="http://schemas.microsoft.com/office/powerpoint/2010/main" val="4201214906"/>
       </p:ext>
     </p:extLst>
   </p:cSld>
@@ -4268,7 +4299,7 @@
           <p:cNvPr id="2" name="Title 1">
             <a:extLst>
               <a:ext uri="{FF2B5EF4-FFF2-40B4-BE49-F238E27FC236}">
-                <a16:creationId xmlns:a16="http://schemas.microsoft.com/office/drawing/2014/main" id="{6B0C98E0-6559-191E-8773-DC656DA6405E}"/>
+                <a16:creationId xmlns:a16="http://schemas.microsoft.com/office/drawing/2014/main" id="{5642AD9B-94A1-A7ED-D7D9-C8E8C84894E8}"/>
               </a:ext>
             </a:extLst>
           </p:cNvPr>
@@ -4286,7 +4317,7 @@
           <a:p>
             <a:r>
               <a:rPr lang="en-SI" dirty="0"/>
-              <a:t>TOOLS</a:t>
+              <a:t>Work plan</a:t>
             </a:r>
           </a:p>
         </p:txBody>
@@ -4296,7 +4327,7 @@
           <p:cNvPr id="3" name="Content Placeholder 2">
             <a:extLst>
               <a:ext uri="{FF2B5EF4-FFF2-40B4-BE49-F238E27FC236}">
-                <a16:creationId xmlns:a16="http://schemas.microsoft.com/office/drawing/2014/main" id="{1E4F4320-80C6-5E6A-23B5-41F08AB4130A}"/>
+                <a16:creationId xmlns:a16="http://schemas.microsoft.com/office/drawing/2014/main" id="{E924E37D-FB13-F89D-D0F8-130B31087517}"/>
               </a:ext>
             </a:extLst>
           </p:cNvPr>
@@ -4313,93 +4344,47 @@
           <a:lstStyle/>
           <a:p>
             <a:r>
-              <a:rPr lang="en-SI" dirty="0"/>
-              <a:t>Mobile app:</a:t>
-            </a:r>
-          </a:p>
-          <a:p>
-            <a:pPr lvl="1">
-              <a:buFont typeface="Courier New" panose="02070309020205020404" pitchFamily="49" charset="0"/>
-              <a:buChar char="o"/>
-            </a:pPr>
-            <a:r>
-              <a:rPr lang="en-SI" dirty="0"/>
-              <a:t>UI: Figma</a:t>
-            </a:r>
-          </a:p>
-          <a:p>
-            <a:pPr lvl="1">
-              <a:buFont typeface="Courier New" panose="02070309020205020404" pitchFamily="49" charset="0"/>
-              <a:buChar char="o"/>
-            </a:pPr>
-            <a:r>
-              <a:rPr lang="en-SI" dirty="0"/>
-              <a:t>?: Flutter</a:t>
-            </a:r>
-          </a:p>
-          <a:p>
-            <a:pPr lvl="1">
-              <a:buFont typeface="Courier New" panose="02070309020205020404" pitchFamily="49" charset="0"/>
-              <a:buChar char="o"/>
-            </a:pPr>
-            <a:r>
-              <a:rPr lang="en-SI" dirty="0"/>
-              <a:t>Backend: ?</a:t>
-            </a:r>
-          </a:p>
-          <a:p>
-            <a:pPr lvl="1">
-              <a:buFont typeface="Courier New" panose="02070309020205020404" pitchFamily="49" charset="0"/>
-              <a:buChar char="o"/>
-            </a:pPr>
-            <a:r>
-              <a:rPr lang="en-SI" dirty="0"/>
-              <a:t>…</a:t>
-            </a:r>
-          </a:p>
-          <a:p>
-            <a:r>
-              <a:rPr lang="en-SI" dirty="0"/>
-              <a:t>Training data processing:</a:t>
-            </a:r>
-          </a:p>
-          <a:p>
-            <a:pPr lvl="1">
-              <a:buFont typeface="Courier New" panose="02070309020205020404" pitchFamily="49" charset="0"/>
-              <a:buChar char="o"/>
-            </a:pPr>
-            <a:r>
-              <a:rPr lang="en-SI" dirty="0"/>
-              <a:t>Python </a:t>
-            </a:r>
-          </a:p>
-          <a:p>
-            <a:pPr lvl="1">
-              <a:buFont typeface="Courier New" panose="02070309020205020404" pitchFamily="49" charset="0"/>
-              <a:buChar char="o"/>
-            </a:pPr>
-            <a:r>
-              <a:rPr lang="en-SI" dirty="0"/>
-              <a:t>Libraries: *</a:t>
-            </a:r>
-          </a:p>
-          <a:p>
-            <a:pPr lvl="1">
-              <a:buFont typeface="Courier New" panose="02070309020205020404" pitchFamily="49" charset="0"/>
-              <a:buChar char="o"/>
-            </a:pPr>
+              <a:rPr lang="en-SI"/>
+              <a:t>tba</a:t>
+            </a:r>
             <a:endParaRPr lang="en-SI" dirty="0"/>
           </a:p>
-          <a:p>
-            <a:pPr lvl="1"/>
-            <a:endParaRPr lang="en-SI" dirty="0"/>
-          </a:p>
-        </p:txBody>
-      </p:sp>
+        </p:txBody>
+      </p:sp>
+      <p:pic>
+        <p:nvPicPr>
+          <p:cNvPr id="5" name="Picture 4" descr="A black screen with white text&#10;&#10;Description automatically generated">
+            <a:extLst>
+              <a:ext uri="{FF2B5EF4-FFF2-40B4-BE49-F238E27FC236}">
+                <a16:creationId xmlns:a16="http://schemas.microsoft.com/office/drawing/2014/main" id="{4291E4B7-1B6E-57C0-3CFD-91E9E15C9646}"/>
+              </a:ext>
+            </a:extLst>
+          </p:cNvPr>
+          <p:cNvPicPr>
+            <a:picLocks noChangeAspect="1"/>
+          </p:cNvPicPr>
+          <p:nvPr/>
+        </p:nvPicPr>
+        <p:blipFill>
+          <a:blip r:embed="rId2"/>
+          <a:stretch>
+            <a:fillRect/>
+          </a:stretch>
+        </p:blipFill>
+        <p:spPr>
+          <a:xfrm>
+            <a:off x="328814" y="2743428"/>
+            <a:ext cx="11534371" cy="2996599"/>
+          </a:xfrm>
+          <a:prstGeom prst="rect">
+            <a:avLst/>
+          </a:prstGeom>
+        </p:spPr>
+      </p:pic>
     </p:spTree>
     <p:extLst>
       <p:ext uri="{BB962C8B-B14F-4D97-AF65-F5344CB8AC3E}">
-        <p14:creationId xmlns:p14="http://schemas.microsoft.com/office/powerpoint/2010/main" val="4050961716"/>
+        <p14:creationId xmlns:p14="http://schemas.microsoft.com/office/powerpoint/2010/main" val="1310027608"/>
       </p:ext>
     </p:extLst>
   </p:cSld>
@@ -4431,7 +4416,7 @@
           <p:cNvPr id="2" name="Title 1">
             <a:extLst>
               <a:ext uri="{FF2B5EF4-FFF2-40B4-BE49-F238E27FC236}">
-                <a16:creationId xmlns:a16="http://schemas.microsoft.com/office/drawing/2014/main" id="{E8260719-1002-D36B-1AC0-16B06E6048D7}"/>
+                <a16:creationId xmlns:a16="http://schemas.microsoft.com/office/drawing/2014/main" id="{0F3E7E7D-474C-A448-6D77-FDF68E50EBF0}"/>
               </a:ext>
             </a:extLst>
           </p:cNvPr>
@@ -4449,7 +4434,7 @@
           <a:p>
             <a:r>
               <a:rPr lang="en-SI" dirty="0"/>
-              <a:t>TOOLS</a:t>
+              <a:t>Troubles</a:t>
             </a:r>
           </a:p>
         </p:txBody>
@@ -4459,7 +4444,7 @@
           <p:cNvPr id="3" name="Content Placeholder 2">
             <a:extLst>
               <a:ext uri="{FF2B5EF4-FFF2-40B4-BE49-F238E27FC236}">
-                <a16:creationId xmlns:a16="http://schemas.microsoft.com/office/drawing/2014/main" id="{591EAC77-A702-98FB-983E-282A6FE766BA}"/>
+                <a16:creationId xmlns:a16="http://schemas.microsoft.com/office/drawing/2014/main" id="{CC939A49-A1E1-EDEB-C104-F924A756A598}"/>
               </a:ext>
             </a:extLst>
           </p:cNvPr>
@@ -4477,20 +4462,31 @@
           <a:p>
             <a:r>
               <a:rPr lang="en-SI" dirty="0"/>
-              <a:t>Version control: GitHub</a:t>
+              <a:t>Problems with 3rd party apps for data import (Strava, Connect)</a:t>
             </a:r>
           </a:p>
           <a:p>
             <a:r>
               <a:rPr lang="en-SI" dirty="0"/>
-              <a:t>Task management: Notion</a:t>
-            </a:r>
-          </a:p>
-          <a:p>
+              <a:t>X</a:t>
+            </a:r>
+            <a:r>
+              <a:rPr lang="en-GB" dirty="0"/>
+              <a:t>c</a:t>
+            </a:r>
             <a:r>
               <a:rPr lang="en-SI" dirty="0"/>
-              <a:t>*</a:t>
-            </a:r>
+              <a:t>ode problems</a:t>
+            </a:r>
+          </a:p>
+          <a:p>
+            <a:r>
+              <a:rPr lang="en-SI" dirty="0"/>
+              <a:t>Problems with integrating LLM (expensive)</a:t>
+            </a:r>
+          </a:p>
+          <a:p>
+            <a:endParaRPr lang="en-SI" dirty="0"/>
           </a:p>
           <a:p>
             <a:endParaRPr lang="en-SI" dirty="0"/>
@@ -4500,7 +4496,7 @@
     </p:spTree>
     <p:extLst>
       <p:ext uri="{BB962C8B-B14F-4D97-AF65-F5344CB8AC3E}">
-        <p14:creationId xmlns:p14="http://schemas.microsoft.com/office/powerpoint/2010/main" val="4201214906"/>
+        <p14:creationId xmlns:p14="http://schemas.microsoft.com/office/powerpoint/2010/main" val="1614699891"/>
       </p:ext>
     </p:extLst>
   </p:cSld>
@@ -4532,7 +4528,7 @@
           <p:cNvPr id="2" name="Title 1">
             <a:extLst>
               <a:ext uri="{FF2B5EF4-FFF2-40B4-BE49-F238E27FC236}">
-                <a16:creationId xmlns:a16="http://schemas.microsoft.com/office/drawing/2014/main" id="{D063C46D-82BC-CEC9-410B-C329D40C5EA3}"/>
+                <a16:creationId xmlns:a16="http://schemas.microsoft.com/office/drawing/2014/main" id="{413A5D7E-98D3-7FA2-88FD-839E9FFB765B}"/>
               </a:ext>
             </a:extLst>
           </p:cNvPr>
@@ -4550,7 +4546,7 @@
           <a:p>
             <a:r>
               <a:rPr lang="en-SI" dirty="0"/>
-              <a:t>Other apps</a:t>
+              <a:t>demo</a:t>
             </a:r>
           </a:p>
         </p:txBody>
@@ -4560,7 +4556,7 @@
           <p:cNvPr id="3" name="Content Placeholder 2">
             <a:extLst>
               <a:ext uri="{FF2B5EF4-FFF2-40B4-BE49-F238E27FC236}">
-                <a16:creationId xmlns:a16="http://schemas.microsoft.com/office/drawing/2014/main" id="{E0FD8508-3E3B-3308-88BB-BD7B71998917}"/>
+                <a16:creationId xmlns:a16="http://schemas.microsoft.com/office/drawing/2014/main" id="{9124B389-2ACC-C6F7-3E7C-3116C1C8D7A1}"/>
               </a:ext>
             </a:extLst>
           </p:cNvPr>
@@ -4578,25 +4574,13 @@
           <a:p>
             <a:r>
               <a:rPr lang="en-SI" dirty="0"/>
-              <a:t>Strava</a:t>
+              <a:t>iPhone app</a:t>
             </a:r>
           </a:p>
           <a:p>
             <a:r>
               <a:rPr lang="en-SI" dirty="0"/>
-              <a:t>Garmin Connect</a:t>
-            </a:r>
-          </a:p>
-          <a:p>
-            <a:r>
-              <a:rPr lang="en-SI" dirty="0"/>
-              <a:t>TrainingPeaks</a:t>
-            </a:r>
-          </a:p>
-          <a:p>
-            <a:r>
-              <a:rPr lang="en-SI" dirty="0"/>
-              <a:t>Free software: Intervals.icu</a:t>
+              <a:t>Basic features</a:t>
             </a:r>
           </a:p>
         </p:txBody>
@@ -4604,7 +4588,7 @@
     </p:spTree>
     <p:extLst>
       <p:ext uri="{BB962C8B-B14F-4D97-AF65-F5344CB8AC3E}">
-        <p14:creationId xmlns:p14="http://schemas.microsoft.com/office/powerpoint/2010/main" val="147444039"/>
+        <p14:creationId xmlns:p14="http://schemas.microsoft.com/office/powerpoint/2010/main" val="3698843230"/>
       </p:ext>
     </p:extLst>
   </p:cSld>
@@ -4872,4 +4856,172 @@
     </a:ext>
   </a:extLst>
 </a:theme>
+</file>
+
+<file path=customXml/item1.xml><?xml version="1.0" encoding="utf-8"?>
+<p:properties xmlns:p="http://schemas.microsoft.com/office/2006/metadata/properties" xmlns:xsi="http://www.w3.org/2001/XMLSchema-instance" xmlns:pc="http://schemas.microsoft.com/office/infopath/2007/PartnerControls">
+  <documentManagement/>
+</p:properties>
+</file>
+
+<file path=customXml/item2.xml><?xml version="1.0" encoding="utf-8"?>
+<?mso-contentType ?>
+<FormTemplates xmlns="http://schemas.microsoft.com/sharepoint/v3/contenttype/forms">
+  <Display>DocumentLibraryForm</Display>
+  <Edit>DocumentLibraryForm</Edit>
+  <New>DocumentLibraryForm</New>
+</FormTemplates>
+</file>
+
+<file path=customXml/item3.xml><?xml version="1.0" encoding="utf-8"?>
+<ct:contentTypeSchema xmlns:ct="http://schemas.microsoft.com/office/2006/metadata/contentType" xmlns:ma="http://schemas.microsoft.com/office/2006/metadata/properties/metaAttributes" ct:_="" ma:_="" ma:contentTypeName="Dokument" ma:contentTypeID="0x01010006BD4484BBA592428B2CFF1FDC8A9F9A" ma:contentTypeVersion="0" ma:contentTypeDescription="Ustvari nov dokument." ma:contentTypeScope="" ma:versionID="d75c85ad4bceb16b0fedc748b08aa994">
+  <xsd:schema xmlns:xsd="http://www.w3.org/2001/XMLSchema" xmlns:xs="http://www.w3.org/2001/XMLSchema" xmlns:p="http://schemas.microsoft.com/office/2006/metadata/properties" targetNamespace="http://schemas.microsoft.com/office/2006/metadata/properties" ma:root="true" ma:fieldsID="e38a63f0386f459f52edc034fd72f6a8">
+    <xsd:element name="properties">
+      <xsd:complexType>
+        <xsd:sequence>
+          <xsd:element name="documentManagement">
+            <xsd:complexType>
+              <xsd:all/>
+            </xsd:complexType>
+          </xsd:element>
+        </xsd:sequence>
+      </xsd:complexType>
+    </xsd:element>
+  </xsd:schema>
+  <xsd:schema xmlns="http://schemas.openxmlformats.org/package/2006/metadata/core-properties" xmlns:xsd="http://www.w3.org/2001/XMLSchema" xmlns:xsi="http://www.w3.org/2001/XMLSchema-instance" xmlns:dc="http://purl.org/dc/elements/1.1/" xmlns:dcterms="http://purl.org/dc/terms/" xmlns:odoc="http://schemas.microsoft.com/internal/obd" targetNamespace="http://schemas.openxmlformats.org/package/2006/metadata/core-properties" elementFormDefault="qualified" attributeFormDefault="unqualified" blockDefault="#all">
+    <xsd:import namespace="http://purl.org/dc/elements/1.1/" schemaLocation="http://dublincore.org/schemas/xmls/qdc/2003/04/02/dc.xsd"/>
+    <xsd:import namespace="http://purl.org/dc/terms/" schemaLocation="http://dublincore.org/schemas/xmls/qdc/2003/04/02/dcterms.xsd"/>
+    <xsd:element name="coreProperties" type="CT_coreProperties"/>
+    <xsd:complexType name="CT_coreProperties">
+      <xsd:all>
+        <xsd:element ref="dc:creator" minOccurs="0" maxOccurs="1"/>
+        <xsd:element ref="dcterms:created" minOccurs="0" maxOccurs="1"/>
+        <xsd:element ref="dc:identifier" minOccurs="0" maxOccurs="1"/>
+        <xsd:element name="contentType" minOccurs="0" maxOccurs="1" type="xsd:string" ma:index="0" ma:displayName="Vrsta vsebine"/>
+        <xsd:element ref="dc:title" minOccurs="0" maxOccurs="1" ma:index="4" ma:displayName="Naslov"/>
+        <xsd:element ref="dc:subject" minOccurs="0" maxOccurs="1"/>
+        <xsd:element ref="dc:description" minOccurs="0" maxOccurs="1"/>
+        <xsd:element name="keywords" minOccurs="0" maxOccurs="1" type="xsd:string"/>
+        <xsd:element ref="dc:language" minOccurs="0" maxOccurs="1"/>
+        <xsd:element name="category" minOccurs="0" maxOccurs="1" type="xsd:string"/>
+        <xsd:element name="version" minOccurs="0" maxOccurs="1" type="xsd:string"/>
+        <xsd:element name="revision" minOccurs="0" maxOccurs="1" type="xsd:string">
+          <xsd:annotation>
+            <xsd:documentation>
+                        This value indicates the number of saves or revisions. The application is responsible for updating this value after each revision.
+                    </xsd:documentation>
+          </xsd:annotation>
+        </xsd:element>
+        <xsd:element name="lastModifiedBy" minOccurs="0" maxOccurs="1" type="xsd:string"/>
+        <xsd:element ref="dcterms:modified" minOccurs="0" maxOccurs="1"/>
+        <xsd:element name="contentStatus" minOccurs="0" maxOccurs="1" type="xsd:string"/>
+      </xsd:all>
+    </xsd:complexType>
+  </xsd:schema>
+  <xs:schema xmlns:pc="http://schemas.microsoft.com/office/infopath/2007/PartnerControls" xmlns:xs="http://www.w3.org/2001/XMLSchema" targetNamespace="http://schemas.microsoft.com/office/infopath/2007/PartnerControls" elementFormDefault="qualified" attributeFormDefault="unqualified">
+    <xs:element name="Person">
+      <xs:complexType>
+        <xs:sequence>
+          <xs:element ref="pc:DisplayName" minOccurs="0"/>
+          <xs:element ref="pc:AccountId" minOccurs="0"/>
+          <xs:element ref="pc:AccountType" minOccurs="0"/>
+        </xs:sequence>
+      </xs:complexType>
+    </xs:element>
+    <xs:element name="DisplayName" type="xs:string"/>
+    <xs:element name="AccountId" type="xs:string"/>
+    <xs:element name="AccountType" type="xs:string"/>
+    <xs:element name="BDCAssociatedEntity">
+      <xs:complexType>
+        <xs:sequence>
+          <xs:element ref="pc:BDCEntity" minOccurs="0" maxOccurs="unbounded"/>
+        </xs:sequence>
+        <xs:attribute ref="pc:EntityNamespace"/>
+        <xs:attribute ref="pc:EntityName"/>
+        <xs:attribute ref="pc:SystemInstanceName"/>
+        <xs:attribute ref="pc:AssociationName"/>
+      </xs:complexType>
+    </xs:element>
+    <xs:attribute name="EntityNamespace" type="xs:string"/>
+    <xs:attribute name="EntityName" type="xs:string"/>
+    <xs:attribute name="SystemInstanceName" type="xs:string"/>
+    <xs:attribute name="AssociationName" type="xs:string"/>
+    <xs:element name="BDCEntity">
+      <xs:complexType>
+        <xs:sequence>
+          <xs:element ref="pc:EntityDisplayName" minOccurs="0"/>
+          <xs:element ref="pc:EntityInstanceReference" minOccurs="0"/>
+          <xs:element ref="pc:EntityId1" minOccurs="0"/>
+          <xs:element ref="pc:EntityId2" minOccurs="0"/>
+          <xs:element ref="pc:EntityId3" minOccurs="0"/>
+          <xs:element ref="pc:EntityId4" minOccurs="0"/>
+          <xs:element ref="pc:EntityId5" minOccurs="0"/>
+        </xs:sequence>
+      </xs:complexType>
+    </xs:element>
+    <xs:element name="EntityDisplayName" type="xs:string"/>
+    <xs:element name="EntityInstanceReference" type="xs:string"/>
+    <xs:element name="EntityId1" type="xs:string"/>
+    <xs:element name="EntityId2" type="xs:string"/>
+    <xs:element name="EntityId3" type="xs:string"/>
+    <xs:element name="EntityId4" type="xs:string"/>
+    <xs:element name="EntityId5" type="xs:string"/>
+    <xs:element name="Terms">
+      <xs:complexType>
+        <xs:sequence>
+          <xs:element ref="pc:TermInfo" minOccurs="0" maxOccurs="unbounded"/>
+        </xs:sequence>
+      </xs:complexType>
+    </xs:element>
+    <xs:element name="TermInfo">
+      <xs:complexType>
+        <xs:sequence>
+          <xs:element ref="pc:TermName" minOccurs="0"/>
+          <xs:element ref="pc:TermId" minOccurs="0"/>
+        </xs:sequence>
+      </xs:complexType>
+    </xs:element>
+    <xs:element name="TermName" type="xs:string"/>
+    <xs:element name="TermId" type="xs:string"/>
+  </xs:schema>
+</ct:contentTypeSchema>
+</file>
+
+<file path=customXml/itemProps1.xml><?xml version="1.0" encoding="utf-8"?>
+<ds:datastoreItem xmlns:ds="http://schemas.openxmlformats.org/officeDocument/2006/customXml" ds:itemID="{E56DBE43-30F9-4AB3-88CE-A8AA32BD920D}">
+  <ds:schemaRefs>
+    <ds:schemaRef ds:uri="http://schemas.microsoft.com/office/2006/documentManagement/types"/>
+    <ds:schemaRef ds:uri="http://purl.org/dc/terms/"/>
+    <ds:schemaRef ds:uri="http://purl.org/dc/elements/1.1/"/>
+    <ds:schemaRef ds:uri="http://schemas.microsoft.com/office/2006/metadata/properties"/>
+    <ds:schemaRef ds:uri="http://schemas.openxmlformats.org/package/2006/metadata/core-properties"/>
+    <ds:schemaRef ds:uri="http://purl.org/dc/dcmitype/"/>
+    <ds:schemaRef ds:uri="http://schemas.microsoft.com/office/infopath/2007/PartnerControls"/>
+    <ds:schemaRef ds:uri="http://www.w3.org/XML/1998/namespace"/>
+  </ds:schemaRefs>
+</ds:datastoreItem>
+</file>
+
+<file path=customXml/itemProps2.xml><?xml version="1.0" encoding="utf-8"?>
+<ds:datastoreItem xmlns:ds="http://schemas.openxmlformats.org/officeDocument/2006/customXml" ds:itemID="{F921AD04-A1EE-40F3-B714-CCECA8152C6E}">
+  <ds:schemaRefs>
+    <ds:schemaRef ds:uri="http://schemas.microsoft.com/sharepoint/v3/contenttype/forms"/>
+  </ds:schemaRefs>
+</ds:datastoreItem>
+</file>
+
+<file path=customXml/itemProps3.xml><?xml version="1.0" encoding="utf-8"?>
+<ds:datastoreItem xmlns:ds="http://schemas.openxmlformats.org/officeDocument/2006/customXml" ds:itemID="{F9076858-849F-4DC8-9F5D-1D6E8DBA1B99}">
+  <ds:schemaRefs>
+    <ds:schemaRef ds:uri="http://schemas.microsoft.com/office/2006/metadata/contentType"/>
+    <ds:schemaRef ds:uri="http://schemas.microsoft.com/office/2006/metadata/properties/metaAttributes"/>
+    <ds:schemaRef ds:uri="http://www.w3.org/2001/XMLSchema"/>
+    <ds:schemaRef ds:uri="http://schemas.microsoft.com/office/2006/metadata/properties"/>
+    <ds:schemaRef ds:uri="http://schemas.openxmlformats.org/package/2006/metadata/core-properties"/>
+    <ds:schemaRef ds:uri="http://purl.org/dc/elements/1.1/"/>
+    <ds:schemaRef ds:uri="http://purl.org/dc/terms/"/>
+    <ds:schemaRef ds:uri="http://schemas.microsoft.com/internal/obd"/>
+    <ds:schemaRef ds:uri="http://schemas.microsoft.com/office/infopath/2007/PartnerControls"/>
+  </ds:schemaRefs>
+</ds:datastoreItem>
 </file>
</xml_diff>